<commit_message>
Still having a problem, getting a background that works well with text.
</commit_message>
<xml_diff>
--- a/Classes/D214 - Data Analytics Graduate Capstone/Performance Assessment(s)/Task 3/D214-nkm2-task3-presentation-of-findings.pptx
+++ b/Classes/D214 - Data Analytics Graduate Capstone/Performance Assessment(s)/Task 3/D214-nkm2-task3-presentation-of-findings.pptx
@@ -107,6 +107,11 @@
       </a:defRPr>
     </a:lvl9pPr>
   </p:defaultTextStyle>
+  <p:extLst>
+    <p:ext uri="{EFAFB233-063F-42B5-8137-9DF3F51BA10A}">
+      <p15:sldGuideLst xmlns:p15="http://schemas.microsoft.com/office/powerpoint/2012/main"/>
+    </p:ext>
+  </p:extLst>
 </p:presentation>
 </file>
 
@@ -192,7 +197,7 @@
           <a:p>
             <a:fld id="{EBC46A10-8373-4DF4-8B6B-88D420408545}" type="datetimeFigureOut">
               <a:rPr lang="en-US" smtClean="0"/>
-              <a:t>12/13/2023</a:t>
+              <a:t>12/15/2023</a:t>
             </a:fld>
             <a:endParaRPr lang="en-US"/>
           </a:p>
@@ -502,12 +507,16 @@
           <a:bodyPr anchor="b"/>
           <a:lstStyle>
             <a:lvl1pPr algn="ctr">
-              <a:defRPr sz="6000"/>
+              <a:defRPr sz="6000" baseline="0">
+                <a:solidFill>
+                  <a:schemeClr val="accent4"/>
+                </a:solidFill>
+              </a:defRPr>
             </a:lvl1pPr>
           </a:lstStyle>
           <a:p>
             <a:r>
-              <a:rPr lang="en-US"/>
+              <a:rPr lang="en-US" dirty="0"/>
               <a:t>Click to edit Master title style</a:t>
             </a:r>
           </a:p>
@@ -540,7 +549,11 @@
           <a:lstStyle>
             <a:lvl1pPr marL="0" indent="0" algn="ctr">
               <a:buNone/>
-              <a:defRPr sz="2400"/>
+              <a:defRPr sz="2400">
+                <a:solidFill>
+                  <a:schemeClr val="accent4"/>
+                </a:solidFill>
+              </a:defRPr>
             </a:lvl1pPr>
             <a:lvl2pPr marL="457200" indent="0" algn="ctr">
               <a:buNone/>
@@ -577,7 +590,7 @@
           </a:lstStyle>
           <a:p>
             <a:r>
-              <a:rPr lang="en-US"/>
+              <a:rPr lang="en-US" dirty="0"/>
               <a:t>Click to edit Master subtitle style</a:t>
             </a:r>
           </a:p>
@@ -614,7 +627,7 @@
             <a:lvl1pPr algn="l">
               <a:defRPr sz="1200" baseline="0">
                 <a:solidFill>
-                  <a:schemeClr val="bg1"/>
+                  <a:schemeClr val="accent4"/>
                 </a:solidFill>
               </a:defRPr>
             </a:lvl1pPr>
@@ -664,7 +677,7 @@
             <a:lvl1pPr algn="ctr">
               <a:defRPr sz="1200" baseline="0">
                 <a:solidFill>
-                  <a:schemeClr val="bg1"/>
+                  <a:schemeClr val="accent4"/>
                 </a:solidFill>
               </a:defRPr>
             </a:lvl1pPr>
@@ -720,7 +733,7 @@
             <a:lvl1pPr algn="r">
               <a:defRPr sz="1200" baseline="0">
                 <a:solidFill>
-                  <a:schemeClr val="bg1"/>
+                  <a:schemeClr val="accent4"/>
                 </a:solidFill>
               </a:defRPr>
             </a:lvl1pPr>
@@ -743,7 +756,7 @@
     </p:extLst>
   </p:cSld>
   <p:clrMapOvr>
-    <a:masterClrMapping/>
+    <a:overrideClrMapping bg1="lt1" tx1="dk1" bg2="lt2" tx2="dk2" accent1="accent1" accent2="accent2" accent3="accent3" accent4="accent4" accent5="accent5" accent6="accent6" hlink="hlink" folHlink="folHlink"/>
   </p:clrMapOvr>
 </p:sldLayout>
 </file>
@@ -3852,12 +3865,9 @@
   <p:cSld>
     <p:bg>
       <p:bgPr>
-        <a:blipFill>
-          <a:blip r:embed="rId13"/>
-          <a:stretch>
-            <a:fillRect/>
-          </a:stretch>
-        </a:blipFill>
+        <a:solidFill>
+          <a:schemeClr val="bg1"/>
+        </a:solidFill>
         <a:effectLst/>
       </p:bgPr>
     </p:bg>
@@ -4519,7 +4529,7 @@
 <file path=ppt/theme/theme1.xml><?xml version="1.0" encoding="utf-8"?>
 <a:theme xmlns:a="http://schemas.openxmlformats.org/drawingml/2006/main" name="Office Theme">
   <a:themeElements>
-    <a:clrScheme name="Office">
+    <a:clrScheme name="Red Violet">
       <a:dk1>
         <a:sysClr val="windowText" lastClr="000000"/>
       </a:dk1>
@@ -4527,34 +4537,34 @@
         <a:sysClr val="window" lastClr="FFFFFF"/>
       </a:lt1>
       <a:dk2>
-        <a:srgbClr val="44546A"/>
+        <a:srgbClr val="454551"/>
       </a:dk2>
       <a:lt2>
-        <a:srgbClr val="E7E6E6"/>
+        <a:srgbClr val="D8D9DC"/>
       </a:lt2>
       <a:accent1>
-        <a:srgbClr val="4472C4"/>
+        <a:srgbClr val="E32D91"/>
       </a:accent1>
       <a:accent2>
-        <a:srgbClr val="ED7D31"/>
+        <a:srgbClr val="C830CC"/>
       </a:accent2>
       <a:accent3>
-        <a:srgbClr val="A5A5A5"/>
+        <a:srgbClr val="4EA6DC"/>
       </a:accent3>
       <a:accent4>
-        <a:srgbClr val="FFC000"/>
+        <a:srgbClr val="4775E7"/>
       </a:accent4>
       <a:accent5>
-        <a:srgbClr val="5B9BD5"/>
+        <a:srgbClr val="8971E1"/>
       </a:accent5>
       <a:accent6>
-        <a:srgbClr val="70AD47"/>
+        <a:srgbClr val="D54773"/>
       </a:accent6>
       <a:hlink>
-        <a:srgbClr val="0563C1"/>
+        <a:srgbClr val="6B9F25"/>
       </a:hlink>
       <a:folHlink>
-        <a:srgbClr val="954F72"/>
+        <a:srgbClr val="8C8C8C"/>
       </a:folHlink>
     </a:clrScheme>
     <a:fontScheme name="Office">

</xml_diff>

<commit_message>
Setting up presentation template.
</commit_message>
<xml_diff>
--- a/Classes/D214 - Data Analytics Graduate Capstone/Performance Assessment(s)/Task 3/D214-nkm2-task3-presentation-of-findings.pptx
+++ b/Classes/D214 - Data Analytics Graduate Capstone/Performance Assessment(s)/Task 3/D214-nkm2-task3-presentation-of-findings.pptx
@@ -5,8 +5,17 @@
     <p:sldMasterId id="2147483648" r:id="rId1"/>
   </p:sldMasterIdLst>
   <p:notesMasterIdLst>
-    <p:notesMasterId r:id="rId2"/>
+    <p:notesMasterId r:id="rId9"/>
   </p:notesMasterIdLst>
+  <p:sldIdLst>
+    <p:sldId id="256" r:id="rId2"/>
+    <p:sldId id="257" r:id="rId3"/>
+    <p:sldId id="258" r:id="rId4"/>
+    <p:sldId id="259" r:id="rId5"/>
+    <p:sldId id="260" r:id="rId6"/>
+    <p:sldId id="261" r:id="rId7"/>
+    <p:sldId id="262" r:id="rId8"/>
+  </p:sldIdLst>
   <p:sldSz cx="12192000" cy="6858000"/>
   <p:notesSz cx="6858000" cy="9144000"/>
   <p:defaultTextStyle>
@@ -104,6 +113,11 @@
       </a:defRPr>
     </a:lvl9pPr>
   </p:defaultTextStyle>
+  <p:extLst>
+    <p:ext uri="{EFAFB233-063F-42B5-8137-9DF3F51BA10A}">
+      <p15:sldGuideLst xmlns:p15="http://schemas.microsoft.com/office/powerpoint/2012/main"/>
+    </p:ext>
+  </p:extLst>
 </p:presentation>
 </file>
 
@@ -456,13 +470,155 @@
 </p:notesMaster>
 </file>
 
+<file path=ppt/slideLayouts/slideLayout1.xml><?xml version="1.0" encoding="utf-8"?>
+<p:sldLayout xmlns:a="http://schemas.openxmlformats.org/drawingml/2006/main" xmlns:r="http://schemas.openxmlformats.org/officeDocument/2006/relationships" xmlns:p="http://schemas.openxmlformats.org/presentationml/2006/main" type="title" preserve="1">
+  <p:cSld name="Title Slide">
+    <p:spTree>
+      <p:nvGrpSpPr>
+        <p:cNvPr id="1" name=""/>
+        <p:cNvGrpSpPr/>
+        <p:nvPr/>
+      </p:nvGrpSpPr>
+      <p:grpSpPr>
+        <a:xfrm>
+          <a:off x="0" y="0"/>
+          <a:ext cx="0" cy="0"/>
+          <a:chOff x="0" y="0"/>
+          <a:chExt cx="0" cy="0"/>
+        </a:xfrm>
+      </p:grpSpPr>
+      <p:sp>
+        <p:nvSpPr>
+          <p:cNvPr id="2" name="Title 1">
+            <a:extLst>
+              <a:ext uri="{FF2B5EF4-FFF2-40B4-BE49-F238E27FC236}">
+                <a16:creationId xmlns:a16="http://schemas.microsoft.com/office/drawing/2014/main" id="{9BAC9BEA-F83B-755E-15CF-FB4C13D550C2}"/>
+              </a:ext>
+            </a:extLst>
+          </p:cNvPr>
+          <p:cNvSpPr>
+            <a:spLocks noGrp="1"/>
+          </p:cNvSpPr>
+          <p:nvPr>
+            <p:ph type="ctrTitle"/>
+          </p:nvPr>
+        </p:nvSpPr>
+        <p:spPr>
+          <a:xfrm>
+            <a:off x="1524000" y="1122363"/>
+            <a:ext cx="9144000" cy="2387600"/>
+          </a:xfrm>
+        </p:spPr>
+        <p:txBody>
+          <a:bodyPr anchor="b"/>
+          <a:lstStyle>
+            <a:lvl1pPr algn="ctr">
+              <a:defRPr sz="6000"/>
+            </a:lvl1pPr>
+          </a:lstStyle>
+          <a:p>
+            <a:r>
+              <a:rPr lang="en-US"/>
+              <a:t>Click to edit Master title style</a:t>
+            </a:r>
+          </a:p>
+        </p:txBody>
+      </p:sp>
+      <p:sp>
+        <p:nvSpPr>
+          <p:cNvPr id="3" name="Subtitle 2">
+            <a:extLst>
+              <a:ext uri="{FF2B5EF4-FFF2-40B4-BE49-F238E27FC236}">
+                <a16:creationId xmlns:a16="http://schemas.microsoft.com/office/drawing/2014/main" id="{6F34E682-2870-04C6-2395-4167D0895D08}"/>
+              </a:ext>
+            </a:extLst>
+          </p:cNvPr>
+          <p:cNvSpPr>
+            <a:spLocks noGrp="1"/>
+          </p:cNvSpPr>
+          <p:nvPr>
+            <p:ph type="subTitle" idx="1"/>
+          </p:nvPr>
+        </p:nvSpPr>
+        <p:spPr>
+          <a:xfrm>
+            <a:off x="1524000" y="3602038"/>
+            <a:ext cx="9144000" cy="1655762"/>
+          </a:xfrm>
+        </p:spPr>
+        <p:txBody>
+          <a:bodyPr/>
+          <a:lstStyle>
+            <a:lvl1pPr marL="0" indent="0" algn="ctr">
+              <a:buNone/>
+              <a:defRPr sz="2400"/>
+            </a:lvl1pPr>
+            <a:lvl2pPr marL="457200" indent="0" algn="ctr">
+              <a:buNone/>
+              <a:defRPr sz="2000"/>
+            </a:lvl2pPr>
+            <a:lvl3pPr marL="914400" indent="0" algn="ctr">
+              <a:buNone/>
+              <a:defRPr sz="1800"/>
+            </a:lvl3pPr>
+            <a:lvl4pPr marL="1371600" indent="0" algn="ctr">
+              <a:buNone/>
+              <a:defRPr sz="1600"/>
+            </a:lvl4pPr>
+            <a:lvl5pPr marL="1828800" indent="0" algn="ctr">
+              <a:buNone/>
+              <a:defRPr sz="1600"/>
+            </a:lvl5pPr>
+            <a:lvl6pPr marL="2286000" indent="0" algn="ctr">
+              <a:buNone/>
+              <a:defRPr sz="1600"/>
+            </a:lvl6pPr>
+            <a:lvl7pPr marL="2743200" indent="0" algn="ctr">
+              <a:buNone/>
+              <a:defRPr sz="1600"/>
+            </a:lvl7pPr>
+            <a:lvl8pPr marL="3200400" indent="0" algn="ctr">
+              <a:buNone/>
+              <a:defRPr sz="1600"/>
+            </a:lvl8pPr>
+            <a:lvl9pPr marL="3657600" indent="0" algn="ctr">
+              <a:buNone/>
+              <a:defRPr sz="1600"/>
+            </a:lvl9pPr>
+          </a:lstStyle>
+          <a:p>
+            <a:r>
+              <a:rPr lang="en-US"/>
+              <a:t>Click to edit Master subtitle style</a:t>
+            </a:r>
+          </a:p>
+        </p:txBody>
+      </p:sp>
+    </p:spTree>
+    <p:extLst>
+      <p:ext uri="{BB962C8B-B14F-4D97-AF65-F5344CB8AC3E}">
+        <p14:creationId xmlns:p14="http://schemas.microsoft.com/office/powerpoint/2010/main" val="1415442967"/>
+      </p:ext>
+    </p:extLst>
+  </p:cSld>
+  <p:clrMapOvr>
+    <a:masterClrMapping/>
+  </p:clrMapOvr>
+</p:sldLayout>
+</file>
+
 <file path=ppt/slideMasters/slideMaster1.xml><?xml version="1.0" encoding="utf-8"?>
 <p:sldMaster xmlns:a="http://schemas.openxmlformats.org/drawingml/2006/main" xmlns:r="http://schemas.openxmlformats.org/officeDocument/2006/relationships" xmlns:p="http://schemas.openxmlformats.org/presentationml/2006/main">
   <p:cSld>
     <p:bg>
-      <p:bgRef idx="1001">
-        <a:schemeClr val="bg1"/>
-      </p:bgRef>
+      <p:bgPr>
+        <a:solidFill>
+          <a:schemeClr val="bg1">
+            <a:lumMod val="50000"/>
+          </a:schemeClr>
+        </a:solidFill>
+        <a:effectLst/>
+      </p:bgPr>
     </p:bg>
     <p:spTree>
       <p:nvGrpSpPr>
@@ -549,35 +705,35 @@
           <a:p>
             <a:pPr lvl="0"/>
             <a:r>
-              <a:rPr lang="en-US"/>
+              <a:rPr lang="en-US" dirty="0"/>
               <a:t>Click to edit Master text styles</a:t>
             </a:r>
           </a:p>
           <a:p>
             <a:pPr lvl="1"/>
             <a:r>
-              <a:rPr lang="en-US"/>
+              <a:rPr lang="en-US" dirty="0"/>
               <a:t>Second level</a:t>
             </a:r>
           </a:p>
           <a:p>
             <a:pPr lvl="2"/>
             <a:r>
-              <a:rPr lang="en-US"/>
+              <a:rPr lang="en-US" dirty="0"/>
               <a:t>Third level</a:t>
             </a:r>
           </a:p>
           <a:p>
             <a:pPr lvl="3"/>
             <a:r>
-              <a:rPr lang="en-US"/>
+              <a:rPr lang="en-US" dirty="0"/>
               <a:t>Fourth level</a:t>
             </a:r>
           </a:p>
           <a:p>
             <a:pPr lvl="4"/>
             <a:r>
-              <a:rPr lang="en-US"/>
+              <a:rPr lang="en-US" dirty="0"/>
               <a:t>Fifth level</a:t>
             </a:r>
           </a:p>
@@ -597,7 +753,7 @@
         </p:nvSpPr>
         <p:spPr>
           <a:xfrm>
-            <a:off x="4068792" y="6176963"/>
+            <a:off x="4744797" y="6209699"/>
             <a:ext cx="3519577" cy="646331"/>
           </a:xfrm>
           <a:prstGeom prst="rect">
@@ -707,26 +863,54 @@
           <a:p>
             <a:pPr algn="ctr"/>
             <a:r>
-              <a:rPr lang="en-US" sz="1200" dirty="0"/>
+              <a:rPr lang="en-US" sz="1200" dirty="0">
+                <a:solidFill>
+                  <a:schemeClr val="accent4"/>
+                </a:solidFill>
+              </a:rPr>
               <a:t>André Davis</a:t>
             </a:r>
             <a:br>
-              <a:rPr lang="en-US" sz="1200" dirty="0"/>
+              <a:rPr lang="en-US" sz="1200" dirty="0">
+                <a:solidFill>
+                  <a:schemeClr val="accent4"/>
+                </a:solidFill>
+              </a:rPr>
             </a:br>
             <a:r>
+              <a:rPr lang="en-US" sz="1200" b="1" dirty="0">
+                <a:solidFill>
+                  <a:schemeClr val="accent4"/>
+                </a:solidFill>
+              </a:rPr>
+              <a:t>Student ID:</a:t>
+            </a:r>
+            <a:r>
+              <a:rPr lang="en-US" sz="1200" dirty="0">
+                <a:solidFill>
+                  <a:schemeClr val="accent4"/>
+                </a:solidFill>
+              </a:rPr>
+              <a:t> 010630641</a:t>
+            </a:r>
+            <a:br>
+              <a:rPr lang="en-US" sz="1200" b="1" dirty="0">
+                <a:solidFill>
+                  <a:schemeClr val="accent4"/>
+                </a:solidFill>
+              </a:rPr>
+            </a:br>
+            <a:r>
+              <a:rPr lang="en-US" sz="1200" b="1" dirty="0">
+                <a:solidFill>
+                  <a:schemeClr val="accent4"/>
+                </a:solidFill>
+              </a:rPr>
+              <a:t>Email</a:t>
+            </a:r>
+            <a:r>
               <a:rPr lang="en-US" sz="1200" b="1" dirty="0"/>
-              <a:t>Student ID:</a:t>
-            </a:r>
-            <a:r>
-              <a:rPr lang="en-US" sz="1200" dirty="0"/>
-              <a:t> 010630641</a:t>
-            </a:r>
-            <a:br>
-              <a:rPr lang="en-US" sz="1200" b="1" dirty="0"/>
-            </a:br>
-            <a:r>
-              <a:rPr lang="en-US" sz="1200" b="1" dirty="0"/>
-              <a:t>Email:</a:t>
+              <a:t>:</a:t>
             </a:r>
             <a:r>
               <a:rPr lang="en-US" sz="1200" dirty="0"/>
@@ -734,7 +918,7 @@
             </a:r>
             <a:r>
               <a:rPr lang="en-US" sz="1200" dirty="0">
-                <a:hlinkClick r:id="rId2"/>
+                <a:hlinkClick r:id="rId3"/>
               </a:rPr>
               <a:t>ada1962@wgu.edu</a:t>
             </a:r>
@@ -757,13 +941,13 @@
           <p:nvPr userDrawn="1"/>
         </p:nvPicPr>
         <p:blipFill>
-          <a:blip r:embed="rId3">
+          <a:blip r:embed="rId4">
             <a:extLst>
               <a:ext uri="{28A0092B-C50C-407E-A947-70E740481C1C}">
                 <a14:useLocalDpi xmlns:a14="http://schemas.microsoft.com/office/drawing/2010/main" val="0"/>
               </a:ext>
               <a:ext uri="{96DAC541-7B7A-43D3-8B79-37D633B846F1}">
-                <asvg:svgBlip xmlns:asvg="http://schemas.microsoft.com/office/drawing/2016/SVG/main" r:embed="rId4"/>
+                <asvg:svgBlip xmlns:asvg="http://schemas.microsoft.com/office/drawing/2016/SVG/main" r:embed="rId5"/>
               </a:ext>
             </a:extLst>
           </a:blip>
@@ -781,6 +965,41 @@
           </a:prstGeom>
         </p:spPr>
       </p:pic>
+      <p:pic>
+        <p:nvPicPr>
+          <p:cNvPr id="5" name="Picture 4" descr="A logo with lines and dots&#10;&#10;Description automatically generated">
+            <a:extLst>
+              <a:ext uri="{FF2B5EF4-FFF2-40B4-BE49-F238E27FC236}">
+                <a16:creationId xmlns:a16="http://schemas.microsoft.com/office/drawing/2014/main" id="{2474A061-BCCE-028E-AC46-D70D739802EE}"/>
+              </a:ext>
+            </a:extLst>
+          </p:cNvPr>
+          <p:cNvPicPr>
+            <a:picLocks noChangeAspect="1"/>
+          </p:cNvPicPr>
+          <p:nvPr userDrawn="1"/>
+        </p:nvPicPr>
+        <p:blipFill rotWithShape="1">
+          <a:blip r:embed="rId6">
+            <a:extLst>
+              <a:ext uri="{28A0092B-C50C-407E-A947-70E740481C1C}">
+                <a14:useLocalDpi xmlns:a14="http://schemas.microsoft.com/office/drawing/2010/main" val="0"/>
+              </a:ext>
+            </a:extLst>
+          </a:blip>
+          <a:srcRect l="20752" t="21231" r="15322" b="22091"/>
+          <a:stretch/>
+        </p:blipFill>
+        <p:spPr>
+          <a:xfrm>
+            <a:off x="10420150" y="6028257"/>
+            <a:ext cx="933650" cy="827773"/>
+          </a:xfrm>
+          <a:prstGeom prst="rect">
+            <a:avLst/>
+          </a:prstGeom>
+        </p:spPr>
+      </p:pic>
     </p:spTree>
     <p:extLst>
       <p:ext uri="{BB962C8B-B14F-4D97-AF65-F5344CB8AC3E}">
@@ -789,6 +1008,9 @@
     </p:extLst>
   </p:cSld>
   <p:clrMap bg1="lt1" tx1="dk1" bg2="lt2" tx2="dk2" accent1="accent1" accent2="accent2" accent3="accent3" accent4="accent4" accent5="accent5" accent6="accent6" hlink="hlink" folHlink="folHlink"/>
+  <p:sldLayoutIdLst>
+    <p:sldLayoutId id="2147483649" r:id="rId1"/>
+  </p:sldLayoutIdLst>
   <p:hf hdr="0" ftr="0" dt="0"/>
   <p:txStyles>
     <p:titleStyle>
@@ -1073,6 +1295,551 @@
 </p:sldMaster>
 </file>
 
+<file path=ppt/slides/slide1.xml><?xml version="1.0" encoding="utf-8"?>
+<p:sld xmlns:a="http://schemas.openxmlformats.org/drawingml/2006/main" xmlns:r="http://schemas.openxmlformats.org/officeDocument/2006/relationships" xmlns:p="http://schemas.openxmlformats.org/presentationml/2006/main">
+  <p:cSld>
+    <p:bg>
+      <p:bgPr>
+        <a:solidFill>
+          <a:schemeClr val="tx2"/>
+        </a:solidFill>
+        <a:effectLst/>
+      </p:bgPr>
+    </p:bg>
+    <p:spTree>
+      <p:nvGrpSpPr>
+        <p:cNvPr id="1" name=""/>
+        <p:cNvGrpSpPr/>
+        <p:nvPr/>
+      </p:nvGrpSpPr>
+      <p:grpSpPr>
+        <a:xfrm>
+          <a:off x="0" y="0"/>
+          <a:ext cx="0" cy="0"/>
+          <a:chOff x="0" y="0"/>
+          <a:chExt cx="0" cy="0"/>
+        </a:xfrm>
+      </p:grpSpPr>
+      <p:sp>
+        <p:nvSpPr>
+          <p:cNvPr id="2" name="Title 1">
+            <a:extLst>
+              <a:ext uri="{FF2B5EF4-FFF2-40B4-BE49-F238E27FC236}">
+                <a16:creationId xmlns:a16="http://schemas.microsoft.com/office/drawing/2014/main" id="{4A04CBE6-ECEE-7820-5A5A-BF684677313F}"/>
+              </a:ext>
+            </a:extLst>
+          </p:cNvPr>
+          <p:cNvSpPr>
+            <a:spLocks noGrp="1"/>
+          </p:cNvSpPr>
+          <p:nvPr>
+            <p:ph type="ctrTitle"/>
+          </p:nvPr>
+        </p:nvSpPr>
+        <p:spPr>
+          <a:xfrm>
+            <a:off x="363020" y="259334"/>
+            <a:ext cx="9144000" cy="850275"/>
+          </a:xfrm>
+        </p:spPr>
+        <p:txBody>
+          <a:bodyPr>
+            <a:normAutofit fontScale="90000"/>
+          </a:bodyPr>
+          <a:lstStyle/>
+          <a:p>
+            <a:r>
+              <a:rPr lang="en-US" dirty="0">
+                <a:solidFill>
+                  <a:schemeClr val="accent4"/>
+                </a:solidFill>
+              </a:rPr>
+              <a:t>Introduction and Background</a:t>
+            </a:r>
+          </a:p>
+        </p:txBody>
+      </p:sp>
+    </p:spTree>
+    <p:extLst>
+      <p:ext uri="{BB962C8B-B14F-4D97-AF65-F5344CB8AC3E}">
+        <p14:creationId xmlns:p14="http://schemas.microsoft.com/office/powerpoint/2010/main" val="957264525"/>
+      </p:ext>
+    </p:extLst>
+  </p:cSld>
+  <p:clrMapOvr>
+    <a:masterClrMapping/>
+  </p:clrMapOvr>
+</p:sld>
+</file>
+
+<file path=ppt/slides/slide2.xml><?xml version="1.0" encoding="utf-8"?>
+<p:sld xmlns:a="http://schemas.openxmlformats.org/drawingml/2006/main" xmlns:r="http://schemas.openxmlformats.org/officeDocument/2006/relationships" xmlns:p="http://schemas.openxmlformats.org/presentationml/2006/main">
+  <p:cSld>
+    <p:bg>
+      <p:bgPr>
+        <a:solidFill>
+          <a:schemeClr val="tx2"/>
+        </a:solidFill>
+        <a:effectLst/>
+      </p:bgPr>
+    </p:bg>
+    <p:spTree>
+      <p:nvGrpSpPr>
+        <p:cNvPr id="1" name=""/>
+        <p:cNvGrpSpPr/>
+        <p:nvPr/>
+      </p:nvGrpSpPr>
+      <p:grpSpPr>
+        <a:xfrm>
+          <a:off x="0" y="0"/>
+          <a:ext cx="0" cy="0"/>
+          <a:chOff x="0" y="0"/>
+          <a:chExt cx="0" cy="0"/>
+        </a:xfrm>
+      </p:grpSpPr>
+      <p:sp>
+        <p:nvSpPr>
+          <p:cNvPr id="6" name="Title 1">
+            <a:extLst>
+              <a:ext uri="{FF2B5EF4-FFF2-40B4-BE49-F238E27FC236}">
+                <a16:creationId xmlns:a16="http://schemas.microsoft.com/office/drawing/2014/main" id="{93889E90-8EA1-08B8-92EA-BFAEB4C22961}"/>
+              </a:ext>
+            </a:extLst>
+          </p:cNvPr>
+          <p:cNvSpPr>
+            <a:spLocks noGrp="1"/>
+          </p:cNvSpPr>
+          <p:nvPr>
+            <p:ph type="ctrTitle"/>
+          </p:nvPr>
+        </p:nvSpPr>
+        <p:spPr>
+          <a:xfrm>
+            <a:off x="363020" y="259334"/>
+            <a:ext cx="9144000" cy="850275"/>
+          </a:xfrm>
+        </p:spPr>
+        <p:txBody>
+          <a:bodyPr>
+            <a:normAutofit fontScale="90000"/>
+          </a:bodyPr>
+          <a:lstStyle/>
+          <a:p>
+            <a:pPr algn="l"/>
+            <a:r>
+              <a:rPr lang="en-US" dirty="0">
+                <a:solidFill>
+                  <a:schemeClr val="accent4"/>
+                </a:solidFill>
+              </a:rPr>
+              <a:t>Problem and Hypothesis</a:t>
+            </a:r>
+          </a:p>
+        </p:txBody>
+      </p:sp>
+    </p:spTree>
+    <p:extLst>
+      <p:ext uri="{BB962C8B-B14F-4D97-AF65-F5344CB8AC3E}">
+        <p14:creationId xmlns:p14="http://schemas.microsoft.com/office/powerpoint/2010/main" val="3965386464"/>
+      </p:ext>
+    </p:extLst>
+  </p:cSld>
+  <p:clrMapOvr>
+    <a:masterClrMapping/>
+  </p:clrMapOvr>
+</p:sld>
+</file>
+
+<file path=ppt/slides/slide3.xml><?xml version="1.0" encoding="utf-8"?>
+<p:sld xmlns:a="http://schemas.openxmlformats.org/drawingml/2006/main" xmlns:r="http://schemas.openxmlformats.org/officeDocument/2006/relationships" xmlns:p="http://schemas.openxmlformats.org/presentationml/2006/main">
+  <p:cSld>
+    <p:bg>
+      <p:bgPr>
+        <a:solidFill>
+          <a:schemeClr val="tx2"/>
+        </a:solidFill>
+        <a:effectLst/>
+      </p:bgPr>
+    </p:bg>
+    <p:spTree>
+      <p:nvGrpSpPr>
+        <p:cNvPr id="1" name=""/>
+        <p:cNvGrpSpPr/>
+        <p:nvPr/>
+      </p:nvGrpSpPr>
+      <p:grpSpPr>
+        <a:xfrm>
+          <a:off x="0" y="0"/>
+          <a:ext cx="0" cy="0"/>
+          <a:chOff x="0" y="0"/>
+          <a:chExt cx="0" cy="0"/>
+        </a:xfrm>
+      </p:grpSpPr>
+      <p:sp>
+        <p:nvSpPr>
+          <p:cNvPr id="6" name="Title 1">
+            <a:extLst>
+              <a:ext uri="{FF2B5EF4-FFF2-40B4-BE49-F238E27FC236}">
+                <a16:creationId xmlns:a16="http://schemas.microsoft.com/office/drawing/2014/main" id="{8D26378E-87FB-E543-8CE2-2B956D5D0665}"/>
+              </a:ext>
+            </a:extLst>
+          </p:cNvPr>
+          <p:cNvSpPr>
+            <a:spLocks noGrp="1"/>
+          </p:cNvSpPr>
+          <p:nvPr>
+            <p:ph type="ctrTitle"/>
+          </p:nvPr>
+        </p:nvSpPr>
+        <p:spPr>
+          <a:xfrm>
+            <a:off x="363020" y="259334"/>
+            <a:ext cx="11380342" cy="850275"/>
+          </a:xfrm>
+        </p:spPr>
+        <p:txBody>
+          <a:bodyPr>
+            <a:normAutofit fontScale="90000"/>
+          </a:bodyPr>
+          <a:lstStyle/>
+          <a:p>
+            <a:pPr algn="l"/>
+            <a:r>
+              <a:rPr lang="en-US" dirty="0">
+                <a:solidFill>
+                  <a:schemeClr val="accent4"/>
+                </a:solidFill>
+              </a:rPr>
+              <a:t>Summary of Data-Analysis Process</a:t>
+            </a:r>
+          </a:p>
+        </p:txBody>
+      </p:sp>
+    </p:spTree>
+    <p:extLst>
+      <p:ext uri="{BB962C8B-B14F-4D97-AF65-F5344CB8AC3E}">
+        <p14:creationId xmlns:p14="http://schemas.microsoft.com/office/powerpoint/2010/main" val="4083477535"/>
+      </p:ext>
+    </p:extLst>
+  </p:cSld>
+  <p:clrMapOvr>
+    <a:masterClrMapping/>
+  </p:clrMapOvr>
+</p:sld>
+</file>
+
+<file path=ppt/slides/slide4.xml><?xml version="1.0" encoding="utf-8"?>
+<p:sld xmlns:a="http://schemas.openxmlformats.org/drawingml/2006/main" xmlns:r="http://schemas.openxmlformats.org/officeDocument/2006/relationships" xmlns:p="http://schemas.openxmlformats.org/presentationml/2006/main">
+  <p:cSld>
+    <p:bg>
+      <p:bgPr>
+        <a:solidFill>
+          <a:schemeClr val="tx2"/>
+        </a:solidFill>
+        <a:effectLst/>
+      </p:bgPr>
+    </p:bg>
+    <p:spTree>
+      <p:nvGrpSpPr>
+        <p:cNvPr id="1" name=""/>
+        <p:cNvGrpSpPr/>
+        <p:nvPr/>
+      </p:nvGrpSpPr>
+      <p:grpSpPr>
+        <a:xfrm>
+          <a:off x="0" y="0"/>
+          <a:ext cx="0" cy="0"/>
+          <a:chOff x="0" y="0"/>
+          <a:chExt cx="0" cy="0"/>
+        </a:xfrm>
+      </p:grpSpPr>
+      <p:sp>
+        <p:nvSpPr>
+          <p:cNvPr id="4" name="Title 1">
+            <a:extLst>
+              <a:ext uri="{FF2B5EF4-FFF2-40B4-BE49-F238E27FC236}">
+                <a16:creationId xmlns:a16="http://schemas.microsoft.com/office/drawing/2014/main" id="{3BB07250-A065-644E-70B1-CC960D0F710E}"/>
+              </a:ext>
+            </a:extLst>
+          </p:cNvPr>
+          <p:cNvSpPr>
+            <a:spLocks noGrp="1"/>
+          </p:cNvSpPr>
+          <p:nvPr>
+            <p:ph type="ctrTitle"/>
+          </p:nvPr>
+        </p:nvSpPr>
+        <p:spPr>
+          <a:xfrm>
+            <a:off x="363020" y="259334"/>
+            <a:ext cx="9144000" cy="850275"/>
+          </a:xfrm>
+        </p:spPr>
+        <p:txBody>
+          <a:bodyPr>
+            <a:normAutofit fontScale="90000"/>
+          </a:bodyPr>
+          <a:lstStyle/>
+          <a:p>
+            <a:pPr algn="l"/>
+            <a:r>
+              <a:rPr lang="en-US" dirty="0">
+                <a:solidFill>
+                  <a:schemeClr val="accent4"/>
+                </a:solidFill>
+              </a:rPr>
+              <a:t>Outline of Findings</a:t>
+            </a:r>
+          </a:p>
+        </p:txBody>
+      </p:sp>
+    </p:spTree>
+    <p:extLst>
+      <p:ext uri="{BB962C8B-B14F-4D97-AF65-F5344CB8AC3E}">
+        <p14:creationId xmlns:p14="http://schemas.microsoft.com/office/powerpoint/2010/main" val="317282288"/>
+      </p:ext>
+    </p:extLst>
+  </p:cSld>
+  <p:clrMapOvr>
+    <a:masterClrMapping/>
+  </p:clrMapOvr>
+</p:sld>
+</file>
+
+<file path=ppt/slides/slide5.xml><?xml version="1.0" encoding="utf-8"?>
+<p:sld xmlns:a="http://schemas.openxmlformats.org/drawingml/2006/main" xmlns:r="http://schemas.openxmlformats.org/officeDocument/2006/relationships" xmlns:p="http://schemas.openxmlformats.org/presentationml/2006/main">
+  <p:cSld>
+    <p:bg>
+      <p:bgPr>
+        <a:solidFill>
+          <a:schemeClr val="tx2"/>
+        </a:solidFill>
+        <a:effectLst/>
+      </p:bgPr>
+    </p:bg>
+    <p:spTree>
+      <p:nvGrpSpPr>
+        <p:cNvPr id="1" name=""/>
+        <p:cNvGrpSpPr/>
+        <p:nvPr/>
+      </p:nvGrpSpPr>
+      <p:grpSpPr>
+        <a:xfrm>
+          <a:off x="0" y="0"/>
+          <a:ext cx="0" cy="0"/>
+          <a:chOff x="0" y="0"/>
+          <a:chExt cx="0" cy="0"/>
+        </a:xfrm>
+      </p:grpSpPr>
+      <p:sp>
+        <p:nvSpPr>
+          <p:cNvPr id="4" name="Title 1">
+            <a:extLst>
+              <a:ext uri="{FF2B5EF4-FFF2-40B4-BE49-F238E27FC236}">
+                <a16:creationId xmlns:a16="http://schemas.microsoft.com/office/drawing/2014/main" id="{D6F8AAFB-8E5A-432A-BE70-CA09A003C388}"/>
+              </a:ext>
+            </a:extLst>
+          </p:cNvPr>
+          <p:cNvSpPr>
+            <a:spLocks noGrp="1"/>
+          </p:cNvSpPr>
+          <p:nvPr>
+            <p:ph type="ctrTitle"/>
+          </p:nvPr>
+        </p:nvSpPr>
+        <p:spPr>
+          <a:xfrm>
+            <a:off x="363020" y="259334"/>
+            <a:ext cx="9144000" cy="850275"/>
+          </a:xfrm>
+        </p:spPr>
+        <p:txBody>
+          <a:bodyPr>
+            <a:normAutofit fontScale="90000"/>
+          </a:bodyPr>
+          <a:lstStyle/>
+          <a:p>
+            <a:pPr algn="l"/>
+            <a:r>
+              <a:rPr lang="en-US" dirty="0">
+                <a:solidFill>
+                  <a:schemeClr val="accent4"/>
+                </a:solidFill>
+              </a:rPr>
+              <a:t>Limitations of Techniques/Tools</a:t>
+            </a:r>
+          </a:p>
+        </p:txBody>
+      </p:sp>
+    </p:spTree>
+    <p:extLst>
+      <p:ext uri="{BB962C8B-B14F-4D97-AF65-F5344CB8AC3E}">
+        <p14:creationId xmlns:p14="http://schemas.microsoft.com/office/powerpoint/2010/main" val="463982629"/>
+      </p:ext>
+    </p:extLst>
+  </p:cSld>
+  <p:clrMapOvr>
+    <a:masterClrMapping/>
+  </p:clrMapOvr>
+</p:sld>
+</file>
+
+<file path=ppt/slides/slide6.xml><?xml version="1.0" encoding="utf-8"?>
+<p:sld xmlns:a="http://schemas.openxmlformats.org/drawingml/2006/main" xmlns:r="http://schemas.openxmlformats.org/officeDocument/2006/relationships" xmlns:p="http://schemas.openxmlformats.org/presentationml/2006/main">
+  <p:cSld>
+    <p:bg>
+      <p:bgPr>
+        <a:solidFill>
+          <a:schemeClr val="tx2"/>
+        </a:solidFill>
+        <a:effectLst/>
+      </p:bgPr>
+    </p:bg>
+    <p:spTree>
+      <p:nvGrpSpPr>
+        <p:cNvPr id="1" name=""/>
+        <p:cNvGrpSpPr/>
+        <p:nvPr/>
+      </p:nvGrpSpPr>
+      <p:grpSpPr>
+        <a:xfrm>
+          <a:off x="0" y="0"/>
+          <a:ext cx="0" cy="0"/>
+          <a:chOff x="0" y="0"/>
+          <a:chExt cx="0" cy="0"/>
+        </a:xfrm>
+      </p:grpSpPr>
+      <p:sp>
+        <p:nvSpPr>
+          <p:cNvPr id="4" name="Title 1">
+            <a:extLst>
+              <a:ext uri="{FF2B5EF4-FFF2-40B4-BE49-F238E27FC236}">
+                <a16:creationId xmlns:a16="http://schemas.microsoft.com/office/drawing/2014/main" id="{7DF12E9B-B3C0-BAAB-35EF-BB9E60C1865A}"/>
+              </a:ext>
+            </a:extLst>
+          </p:cNvPr>
+          <p:cNvSpPr>
+            <a:spLocks noGrp="1"/>
+          </p:cNvSpPr>
+          <p:nvPr>
+            <p:ph type="ctrTitle"/>
+          </p:nvPr>
+        </p:nvSpPr>
+        <p:spPr>
+          <a:xfrm>
+            <a:off x="363020" y="259334"/>
+            <a:ext cx="9144000" cy="850275"/>
+          </a:xfrm>
+        </p:spPr>
+        <p:txBody>
+          <a:bodyPr>
+            <a:normAutofit fontScale="90000"/>
+          </a:bodyPr>
+          <a:lstStyle/>
+          <a:p>
+            <a:pPr algn="l"/>
+            <a:r>
+              <a:rPr lang="en-US" dirty="0">
+                <a:solidFill>
+                  <a:schemeClr val="accent4"/>
+                </a:solidFill>
+              </a:rPr>
+              <a:t>Proposed Actions</a:t>
+            </a:r>
+          </a:p>
+        </p:txBody>
+      </p:sp>
+    </p:spTree>
+    <p:extLst>
+      <p:ext uri="{BB962C8B-B14F-4D97-AF65-F5344CB8AC3E}">
+        <p14:creationId xmlns:p14="http://schemas.microsoft.com/office/powerpoint/2010/main" val="1902355175"/>
+      </p:ext>
+    </p:extLst>
+  </p:cSld>
+  <p:clrMapOvr>
+    <a:masterClrMapping/>
+  </p:clrMapOvr>
+</p:sld>
+</file>
+
+<file path=ppt/slides/slide7.xml><?xml version="1.0" encoding="utf-8"?>
+<p:sld xmlns:a="http://schemas.openxmlformats.org/drawingml/2006/main" xmlns:r="http://schemas.openxmlformats.org/officeDocument/2006/relationships" xmlns:p="http://schemas.openxmlformats.org/presentationml/2006/main">
+  <p:cSld>
+    <p:bg>
+      <p:bgPr>
+        <a:solidFill>
+          <a:schemeClr val="tx2"/>
+        </a:solidFill>
+        <a:effectLst/>
+      </p:bgPr>
+    </p:bg>
+    <p:spTree>
+      <p:nvGrpSpPr>
+        <p:cNvPr id="1" name=""/>
+        <p:cNvGrpSpPr/>
+        <p:nvPr/>
+      </p:nvGrpSpPr>
+      <p:grpSpPr>
+        <a:xfrm>
+          <a:off x="0" y="0"/>
+          <a:ext cx="0" cy="0"/>
+          <a:chOff x="0" y="0"/>
+          <a:chExt cx="0" cy="0"/>
+        </a:xfrm>
+      </p:grpSpPr>
+      <p:sp>
+        <p:nvSpPr>
+          <p:cNvPr id="4" name="Title 1">
+            <a:extLst>
+              <a:ext uri="{FF2B5EF4-FFF2-40B4-BE49-F238E27FC236}">
+                <a16:creationId xmlns:a16="http://schemas.microsoft.com/office/drawing/2014/main" id="{2D2EC383-D1E6-EBA6-C301-4C960F7D1F55}"/>
+              </a:ext>
+            </a:extLst>
+          </p:cNvPr>
+          <p:cNvSpPr>
+            <a:spLocks noGrp="1"/>
+          </p:cNvSpPr>
+          <p:nvPr>
+            <p:ph type="ctrTitle"/>
+          </p:nvPr>
+        </p:nvSpPr>
+        <p:spPr>
+          <a:xfrm>
+            <a:off x="363020" y="259334"/>
+            <a:ext cx="9144000" cy="850275"/>
+          </a:xfrm>
+        </p:spPr>
+        <p:txBody>
+          <a:bodyPr>
+            <a:normAutofit fontScale="90000"/>
+          </a:bodyPr>
+          <a:lstStyle/>
+          <a:p>
+            <a:pPr algn="l"/>
+            <a:r>
+              <a:rPr lang="en-US" dirty="0">
+                <a:solidFill>
+                  <a:schemeClr val="accent4"/>
+                </a:solidFill>
+              </a:rPr>
+              <a:t>Benefits of Study</a:t>
+            </a:r>
+          </a:p>
+        </p:txBody>
+      </p:sp>
+    </p:spTree>
+    <p:extLst>
+      <p:ext uri="{BB962C8B-B14F-4D97-AF65-F5344CB8AC3E}">
+        <p14:creationId xmlns:p14="http://schemas.microsoft.com/office/powerpoint/2010/main" val="3646921313"/>
+      </p:ext>
+    </p:extLst>
+  </p:cSld>
+  <p:clrMapOvr>
+    <a:masterClrMapping/>
+  </p:clrMapOvr>
+</p:sld>
+</file>
+
 <file path=ppt/theme/theme1.xml><?xml version="1.0" encoding="utf-8"?>
 <a:theme xmlns:a="http://schemas.openxmlformats.org/drawingml/2006/main" name="Office Theme">
   <a:themeElements>

</xml_diff>